<commit_message>
feat: change to OpenAI
</commit_message>
<xml_diff>
--- a/generated_pptx/IA_Report_Facilities_Physical_Security.pptx
+++ b/generated_pptx/IA_Report_Facilities_Physical_Security.pptx
@@ -3389,7 +3389,7 @@
             </a:pPr>
             <a:r>
               <a:rPr/>
-              <a:t>Title Slide</a:t>
+              <a:t>Internal Audit of Facilities &amp; Physical Security Controls</a:t>
             </a:r>
           </a:p>
         </p:txBody>
@@ -3416,41 +3416,26 @@
           <a:lstStyle/>
           <a:p>
             <a:pPr lvl="0" indent="0" marL="0">
+              <a:spcBef>
+                <a:spcPts val="3000"/>
+              </a:spcBef>
               <a:buNone/>
             </a:pPr>
             <a:r>
               <a:rPr b="1"/>
-              <a:t>Report:</a:t>
-            </a:r>
-            <a:r>
-              <a:rPr/>
-              <a:t> Physical Security and Facilities Access Audit</a:t>
+              <a:t>Corporate Real Estate</a:t>
             </a:r>
           </a:p>
           <a:p>
             <a:pPr lvl="0" indent="0" marL="0">
+              <a:spcBef>
+                <a:spcPts val="3000"/>
+              </a:spcBef>
               <a:buNone/>
             </a:pPr>
             <a:r>
               <a:rPr b="1"/>
-              <a:t>Business Unit:</a:t>
-            </a:r>
-            <a:r>
-              <a:rPr/>
-              <a:t> Corporate Services</a:t>
-            </a:r>
-          </a:p>
-          <a:p>
-            <a:pPr lvl="0" indent="0" marL="0">
-              <a:buNone/>
-            </a:pPr>
-            <a:r>
-              <a:rPr b="1"/>
-              <a:t>Date:</a:t>
-            </a:r>
-            <a:r>
-              <a:rPr/>
-              <a:t> February 15, 2026</a:t>
+              <a:t>February 18, 2026</a:t>
             </a:r>
           </a:p>
         </p:txBody>
@@ -3546,7 +3531,7 @@
             </a:pPr>
             <a:r>
               <a:rPr/>
-              <a:t>To evaluate the effectiveness of physical access controls and site safety measures.</a:t>
+              <a:t>To verify the robustness of physical access controls and facility maintenance logs.</a:t>
             </a:r>
           </a:p>
           <a:p>
@@ -3567,7 +3552,7 @@
             </a:pPr>
             <a:r>
               <a:rPr/>
-              <a:t>The main campus houses 800 employees and high-value data centers.</a:t>
+              <a:t>The organization operates five regional hubs with high-value server rooms and equipment.</a:t>
             </a:r>
           </a:p>
           <a:p>
@@ -3588,7 +3573,7 @@
             </a:pPr>
             <a:r>
               <a:rPr/>
-              <a:t>Review of badge access logs, CCTV coverage, and visitor management systems.</a:t>
+              <a:t>Physical inspection of access logs and security footage from Q4 2025.</a:t>
             </a:r>
           </a:p>
         </p:txBody>
@@ -3676,7 +3661,7 @@
             </a:r>
             <a:r>
               <a:rPr/>
-              <a:t> Biometric scanners for the primary data center were found bypassed during business hours.</a:t>
+              <a:t> Card access logs show cleaning staff and general contractors have 24/7 access to restricted server areas.</a:t>
             </a:r>
           </a:p>
           <a:p>
@@ -3689,7 +3674,7 @@
             </a:r>
             <a:r>
               <a:rPr/>
-              <a:t> Unauthorized physical tampering with critical IT infrastructure.</a:t>
+              <a:t> Potential for unauthorized data tampering or theft of physical infrastructure.</a:t>
             </a:r>
           </a:p>
           <a:p>
@@ -3719,20 +3704,7 @@
             </a:r>
             <a:r>
               <a:rPr/>
-              <a:t> Enforce strict ‘Always Locked’ policy and audit access logs weekly.</a:t>
-            </a:r>
-          </a:p>
-          <a:p>
-            <a:pPr lvl="0" indent="0" marL="0">
-              <a:buNone/>
-            </a:pPr>
-            <a:r>
-              <a:rPr b="1"/>
-              <a:t>Status:</a:t>
-            </a:r>
-            <a:r>
-              <a:rPr/>
-              <a:t> Open</a:t>
+              <a:t> Restrict server room access to authorized IT personnel and implement dual-factor authentication.</a:t>
             </a:r>
           </a:p>
         </p:txBody>
@@ -3785,7 +3757,7 @@
             </a:pPr>
             <a:r>
               <a:rPr/>
-              <a:t>Observation 2: Outdated CCTV Maintenance</a:t>
+              <a:t>Observation 2: Outdated Fire Safety Equipment</a:t>
             </a:r>
           </a:p>
         </p:txBody>
@@ -3820,7 +3792,7 @@
             </a:r>
             <a:r>
               <a:rPr/>
-              <a:t> 25% of security cameras were non-functional or had obstructed views.</a:t>
+              <a:t> 15% of fire extinguishers in the East Wing had expired inspection tags as of December 2025.</a:t>
             </a:r>
           </a:p>
           <a:p>
@@ -3833,7 +3805,7 @@
             </a:r>
             <a:r>
               <a:rPr/>
-              <a:t> Inability to investigate security incidents or provide evidence of theft.</a:t>
+              <a:t> Violation of local health and safety regulations; life safety risk during an emergency.</a:t>
             </a:r>
           </a:p>
           <a:p>
@@ -3863,20 +3835,7 @@
             </a:r>
             <a:r>
               <a:rPr/>
-              <a:t> Contract a third-party maintenance provider for monthly camera checks.</a:t>
-            </a:r>
-          </a:p>
-          <a:p>
-            <a:pPr lvl="0" indent="0" marL="0">
-              <a:buNone/>
-            </a:pPr>
-            <a:r>
-              <a:rPr b="1"/>
-              <a:t>Status:</a:t>
-            </a:r>
-            <a:r>
-              <a:rPr/>
-              <a:t> Open</a:t>
+              <a:t> Establish a digital tracking log for all fire safety assets with automated renewal alerts.</a:t>
             </a:r>
           </a:p>
         </p:txBody>
@@ -3960,7 +3919,7 @@
             </a:pPr>
             <a:r>
               <a:rPr/>
-              <a:t>Repair all faulty CCTV hardware immediately.</a:t>
+              <a:t>Review and revoke excessive access permissions immediately.</a:t>
             </a:r>
           </a:p>
           <a:p>
@@ -3969,7 +3928,7 @@
             </a:pPr>
             <a:r>
               <a:rPr/>
-              <a:t>Re-verify access permissions for all personnel with ‘All Area’ access.</a:t>
+              <a:t>Install biometric locks on critical infrastructure doors.</a:t>
             </a:r>
           </a:p>
           <a:p>
@@ -3978,7 +3937,7 @@
             </a:pPr>
             <a:r>
               <a:rPr/>
-              <a:t>Install alarm sensors on high-security zone doors.</a:t>
+              <a:t>Standardize safety inspection frequencies across all regional hubs.</a:t>
             </a:r>
           </a:p>
         </p:txBody>
@@ -4122,7 +4081,7 @@
                       </a:pPr>
                       <a:r>
                         <a:rPr/>
-                        <a:t>CCTV Repair</a:t>
+                        <a:t>Access Audit</a:t>
                       </a:r>
                     </a:p>
                   </a:txBody>
@@ -4169,7 +4128,7 @@
                       </a:pPr>
                       <a:r>
                         <a:rPr/>
-                        <a:t>Access Audit</a:t>
+                        <a:t>Biometric Upgrade</a:t>
                       </a:r>
                     </a:p>
                   </a:txBody>
@@ -4184,7 +4143,7 @@
                       </a:pPr>
                       <a:r>
                         <a:rPr/>
-                        <a:t>Security Director</a:t>
+                        <a:t>Security Head</a:t>
                       </a:r>
                     </a:p>
                   </a:txBody>
@@ -4199,7 +4158,7 @@
                       </a:pPr>
                       <a:r>
                         <a:rPr/>
-                        <a:t>April 2026</a:t>
+                        <a:t>June 2026</a:t>
                       </a:r>
                     </a:p>
                   </a:txBody>
@@ -4216,7 +4175,7 @@
                       </a:pPr>
                       <a:r>
                         <a:rPr/>
-                        <a:t>Alarm Installation</a:t>
+                        <a:t>Safety Log Setup</a:t>
                       </a:r>
                     </a:p>
                   </a:txBody>
@@ -4231,7 +4190,7 @@
                       </a:pPr>
                       <a:r>
                         <a:rPr/>
-                        <a:t>Ops Lead</a:t>
+                        <a:t>OHS Officer</a:t>
                       </a:r>
                     </a:p>
                   </a:txBody>
@@ -4246,7 +4205,7 @@
                       </a:pPr>
                       <a:r>
                         <a:rPr/>
-                        <a:t>June 2026</a:t>
+                        <a:t>March 2026</a:t>
                       </a:r>
                     </a:p>
                   </a:txBody>

</xml_diff>